<commit_message>
small change in version 1
</commit_message>
<xml_diff>
--- a/Group_5-Presentation-V1_1.pptx
+++ b/Group_5-Presentation-V1_1.pptx
@@ -2463,7 +2463,7 @@
           <a:p>
             <a:fld id="{6AD6EE87-EBD5-4F12-A48A-63ACA297AC8F}" type="datetimeFigureOut">
               <a:rPr lang="en-US" smtClean="0"/>
-              <a:t>06/01/21</a:t>
+              <a:t>06/02/21</a:t>
             </a:fld>
             <a:endParaRPr lang="en-US" dirty="0"/>
           </a:p>
@@ -2673,7 +2673,7 @@
           <a:p>
             <a:fld id="{4CD73815-2707-4475-8F1A-B873CB631BB4}" type="datetimeFigureOut">
               <a:rPr lang="en-US" smtClean="0"/>
-              <a:t>06/01/21</a:t>
+              <a:t>06/02/21</a:t>
             </a:fld>
             <a:endParaRPr lang="en-US" dirty="0"/>
           </a:p>
@@ -2944,7 +2944,7 @@
           <a:p>
             <a:fld id="{2A4AFB99-0EAB-4182-AFF8-E214C82A68F6}" type="datetimeFigureOut">
               <a:rPr lang="en-US" smtClean="0"/>
-              <a:t>06/01/21</a:t>
+              <a:t>06/02/21</a:t>
             </a:fld>
             <a:endParaRPr lang="en-US" dirty="0"/>
           </a:p>
@@ -3623,7 +3623,7 @@
           <a:p>
             <a:fld id="{CFE2B4AB-9FBA-4D9D-84B0-DDE2CD5A07E3}" type="datetimeFigureOut">
               <a:rPr lang="en-US" smtClean="0"/>
-              <a:t>06/01/21</a:t>
+              <a:t>06/02/21</a:t>
             </a:fld>
             <a:endParaRPr lang="en-US"/>
           </a:p>
@@ -3950,7 +3950,7 @@
           <a:p>
             <a:fld id="{5A61015F-7CC6-4D0A-9D87-873EA4C304CC}" type="datetimeFigureOut">
               <a:rPr lang="en-US" smtClean="0"/>
-              <a:t>06/01/21</a:t>
+              <a:t>06/02/21</a:t>
             </a:fld>
             <a:endParaRPr lang="en-US" dirty="0"/>
           </a:p>
@@ -4279,7 +4279,7 @@
           <a:p>
             <a:fld id="{93C6A301-0538-44EC-B09D-202E1042A48B}" type="datetimeFigureOut">
               <a:rPr lang="en-US" smtClean="0"/>
-              <a:t>06/01/21</a:t>
+              <a:t>06/02/21</a:t>
             </a:fld>
             <a:endParaRPr lang="en-US" dirty="0"/>
           </a:p>
@@ -4755,7 +4755,7 @@
           <a:p>
             <a:fld id="{D789574A-8875-45EF-8EA2-3CAA0F7ABC4C}" type="datetimeFigureOut">
               <a:rPr lang="en-US" smtClean="0"/>
-              <a:t>06/01/21</a:t>
+              <a:t>06/02/21</a:t>
             </a:fld>
             <a:endParaRPr lang="en-US" dirty="0"/>
           </a:p>
@@ -4958,7 +4958,7 @@
           <a:p>
             <a:fld id="{67EF4D4C-5367-4C26-9E2B-D8088D7FCA81}" type="datetimeFigureOut">
               <a:rPr lang="en-US" smtClean="0"/>
-              <a:t>06/01/21</a:t>
+              <a:t>06/02/21</a:t>
             </a:fld>
             <a:endParaRPr lang="en-US" dirty="0"/>
           </a:p>
@@ -5132,7 +5132,7 @@
           <a:p>
             <a:fld id="{56E91E96-98B0-4413-9547-46F3504108EF}" type="datetimeFigureOut">
               <a:rPr lang="en-US" smtClean="0"/>
-              <a:t>06/01/21</a:t>
+              <a:t>06/02/21</a:t>
             </a:fld>
             <a:endParaRPr lang="en-US" dirty="0"/>
           </a:p>
@@ -5505,7 +5505,7 @@
           <a:p>
             <a:fld id="{05C68B11-C5A8-448C-8CE9-B1A273C79CFC}" type="datetimeFigureOut">
               <a:rPr lang="en-US" smtClean="0"/>
-              <a:t>06/01/21</a:t>
+              <a:t>06/02/21</a:t>
             </a:fld>
             <a:endParaRPr lang="en-US" dirty="0"/>
           </a:p>
@@ -5855,7 +5855,7 @@
           <a:p>
             <a:fld id="{C7616CA0-919D-4A49-9C8A-62FDFB3A5183}" type="datetimeFigureOut">
               <a:rPr lang="en-US" smtClean="0"/>
-              <a:t>06/01/21</a:t>
+              <a:t>06/02/21</a:t>
             </a:fld>
             <a:endParaRPr lang="en-US" dirty="0"/>
           </a:p>
@@ -6160,7 +6160,7 @@
             <a:fld id="{90298CD5-6C1E-4009-B41F-6DF62E31D3BE}" type="datetimeFigureOut">
               <a:rPr lang="en-US" smtClean="0"/>
               <a:pPr/>
-              <a:t>06/01/21</a:t>
+              <a:t>06/02/21</a:t>
             </a:fld>
             <a:endParaRPr lang="en-US" dirty="0"/>
           </a:p>
@@ -13019,7 +13019,11 @@
             </a:pPr>
             <a:r>
               <a:rPr lang="en-US" sz="2000" dirty="0"/>
-              <a:t>New Average case count per 100k trends (New York)</a:t>
+              <a:t>New Average case count per </a:t>
+            </a:r>
+            <a:r>
+              <a:rPr lang="en-US" sz="2000"/>
+              <a:t>100k trends</a:t>
             </a:r>
             <a:endParaRPr lang="en-US" sz="1500" dirty="0"/>
           </a:p>

</xml_diff>